<commit_message>
Fixed some typing error in the title of the presentation
</commit_message>
<xml_diff>
--- a/files/Flight Route Prediction and Analysis.pptx
+++ b/files/Flight Route Prediction and Analysis.pptx
@@ -116,6 +116,11 @@
       </a:defRPr>
     </a:lvl9pPr>
   </p:defaultTextStyle>
+  <p:extLst>
+    <p:ext uri="{EFAFB233-063F-42B5-8137-9DF3F51BA10A}">
+      <p15:sldGuideLst xmlns:p15="http://schemas.microsoft.com/office/powerpoint/2012/main"/>
+    </p:ext>
+  </p:extLst>
 </p:presentation>
 </file>
 
@@ -265,7 +270,7 @@
             <a:fld id="{26CAB260-099B-4821-98D3-05E07FD6C268}" type="datetime1">
               <a:rPr lang="en-GB"/>
               <a:pPr lvl="0"/>
-              <a:t>05/03/2020</a:t>
+              <a:t>08/03/2020</a:t>
             </a:fld>
             <a:endParaRPr lang="en-GB"/>
           </a:p>
@@ -687,7 +692,12 @@
             <p:ph type="sldImg"/>
           </p:nvPr>
         </p:nvSpPr>
-        <p:spPr/>
+        <p:spPr>
+          <a:xfrm>
+            <a:off x="685800" y="1143000"/>
+            <a:ext cx="5486400" cy="3086100"/>
+          </a:xfrm>
+        </p:spPr>
       </p:sp>
       <p:sp>
         <p:nvSpPr>
@@ -712,8 +722,12 @@
           <a:p>
             <a:pPr lvl="0"/>
             <a:r>
-              <a:rPr lang="nb-NO"/>
-              <a:t>Megh and Mohammed</a:t>
+              <a:rPr lang="nb-NO" dirty="0" err="1"/>
+              <a:t>Megh</a:t>
+            </a:r>
+            <a:r>
+              <a:rPr lang="nb-NO" dirty="0"/>
+              <a:t> and Mohammed</a:t>
             </a:r>
           </a:p>
         </p:txBody>
@@ -982,57 +996,65 @@
           <a:p>
             <a:pPr lvl="0"/>
             <a:r>
-              <a:rPr lang="en-GB"/>
+              <a:rPr lang="en-GB" dirty="0"/>
               <a:t>Mohammed</a:t>
             </a:r>
           </a:p>
           <a:p>
             <a:pPr lvl="0"/>
-            <a:endParaRPr lang="en-GB"/>
-          </a:p>
-          <a:p>
-            <a:pPr lvl="0"/>
-            <a:r>
-              <a:rPr lang="en-GB"/>
-              <a:t>We will open our project by using PySpark to process our dataset and construct some basic statistics like the sum, average, median, mode of delays different delays based on route, origin, destination, aircraft and time.</a:t>
-            </a:r>
-          </a:p>
-          <a:p>
-            <a:pPr lvl="0"/>
-            <a:endParaRPr lang="nb-NO"/>
-          </a:p>
-          <a:p>
-            <a:pPr lvl="0"/>
-            <a:r>
-              <a:rPr lang="en-GB"/>
+            <a:endParaRPr lang="en-GB" dirty="0"/>
+          </a:p>
+          <a:p>
+            <a:pPr lvl="0"/>
+            <a:r>
+              <a:rPr lang="en-GB" dirty="0"/>
+              <a:t>We will open our project by using </a:t>
+            </a:r>
+            <a:r>
+              <a:rPr lang="en-GB" dirty="0" err="1"/>
+              <a:t>PySpark</a:t>
+            </a:r>
+            <a:r>
+              <a:rPr lang="en-GB" dirty="0"/>
+              <a:t> to process our dataset and construct some basic statistics like the sum, average, median, mode of delays different delays based on route, origin, destination, aircraft and time.</a:t>
+            </a:r>
+          </a:p>
+          <a:p>
+            <a:pPr lvl="0"/>
+            <a:endParaRPr lang="nb-NO" dirty="0"/>
+          </a:p>
+          <a:p>
+            <a:pPr lvl="0"/>
+            <a:r>
+              <a:rPr lang="en-GB" dirty="0"/>
               <a:t>Multiple simulation software is used to train new pilots and in air crash investigations are depended on having a dataset that is easily scalable and accessible.</a:t>
             </a:r>
           </a:p>
           <a:p>
             <a:pPr lvl="0"/>
-            <a:endParaRPr lang="nb-NO"/>
-          </a:p>
-          <a:p>
-            <a:pPr lvl="0"/>
-            <a:r>
-              <a:rPr lang="en-GB"/>
+            <a:endParaRPr lang="nb-NO" dirty="0"/>
+          </a:p>
+          <a:p>
+            <a:pPr lvl="0"/>
+            <a:r>
+              <a:rPr lang="en-GB" dirty="0"/>
               <a:t>We are going to try building a prediction model that can be stored on the Hadoop File System.</a:t>
             </a:r>
           </a:p>
           <a:p>
             <a:pPr lvl="0"/>
             <a:r>
-              <a:rPr lang="en-GB"/>
+              <a:rPr lang="en-GB" dirty="0"/>
               <a:t>This model should allow a user to predict flight delays, hopefully with a good accuracy.</a:t>
             </a:r>
           </a:p>
           <a:p>
             <a:pPr lvl="0"/>
-            <a:endParaRPr lang="nb-NO"/>
-          </a:p>
-          <a:p>
-            <a:pPr lvl="0"/>
-            <a:endParaRPr lang="nb-NO"/>
+            <a:endParaRPr lang="nb-NO" dirty="0"/>
+          </a:p>
+          <a:p>
+            <a:pPr lvl="0"/>
+            <a:endParaRPr lang="nb-NO" dirty="0"/>
           </a:p>
         </p:txBody>
       </p:sp>
@@ -1815,7 +1837,12 @@
             <p:ph type="sldImg"/>
           </p:nvPr>
         </p:nvSpPr>
-        <p:spPr/>
+        <p:spPr>
+          <a:xfrm>
+            <a:off x="685800" y="1143000"/>
+            <a:ext cx="5486400" cy="3086100"/>
+          </a:xfrm>
+        </p:spPr>
       </p:sp>
       <p:sp>
         <p:nvSpPr>
@@ -2177,7 +2204,7 @@
             <a:fld id="{37733AC4-FD05-4F82-B503-BB2600BCC93D}" type="datetime1">
               <a:rPr lang="en-GB"/>
               <a:pPr lvl="0"/>
-              <a:t>05/03/2020</a:t>
+              <a:t>08/03/2020</a:t>
             </a:fld>
             <a:endParaRPr lang="en-GB"/>
           </a:p>
@@ -2414,7 +2441,7 @@
             <a:fld id="{FEBF5A10-6077-4422-817D-C1FCCBCADB40}" type="datetime1">
               <a:rPr lang="en-GB"/>
               <a:pPr lvl="0"/>
-              <a:t>05/03/2020</a:t>
+              <a:t>08/03/2020</a:t>
             </a:fld>
             <a:endParaRPr lang="en-GB"/>
           </a:p>
@@ -2660,7 +2687,7 @@
             <a:fld id="{F4A4111F-A079-41FD-ACF0-DD7B0C3EDBD7}" type="datetime1">
               <a:rPr lang="en-GB"/>
               <a:pPr lvl="0"/>
-              <a:t>05/03/2020</a:t>
+              <a:t>08/03/2020</a:t>
             </a:fld>
             <a:endParaRPr lang="en-GB"/>
           </a:p>
@@ -2896,7 +2923,7 @@
             <a:fld id="{EFE82DB8-8885-42B6-8AAD-D283922BFAD6}" type="datetime1">
               <a:rPr lang="en-GB"/>
               <a:pPr lvl="0"/>
-              <a:t>05/03/2020</a:t>
+              <a:t>08/03/2020</a:t>
             </a:fld>
             <a:endParaRPr lang="en-GB"/>
           </a:p>
@@ -3107,7 +3134,7 @@
             <a:fld id="{8A875C44-0AD8-4B92-8662-5D292A3A3E2B}" type="datetime1">
               <a:rPr lang="en-GB"/>
               <a:pPr lvl="0"/>
-              <a:t>05/03/2020</a:t>
+              <a:t>08/03/2020</a:t>
             </a:fld>
             <a:endParaRPr lang="en-GB"/>
           </a:p>
@@ -3427,7 +3454,7 @@
             <a:fld id="{5E863A40-1140-4413-ADA1-3E8A34D53587}" type="datetime1">
               <a:rPr lang="en-GB"/>
               <a:pPr lvl="0"/>
-              <a:t>05/03/2020</a:t>
+              <a:t>08/03/2020</a:t>
             </a:fld>
             <a:endParaRPr lang="en-GB"/>
           </a:p>
@@ -3830,7 +3857,7 @@
             <a:fld id="{0660B2A6-6314-4441-BCBE-0A4CEBF7594A}" type="datetime1">
               <a:rPr lang="en-GB"/>
               <a:pPr lvl="0"/>
-              <a:t>05/03/2020</a:t>
+              <a:t>08/03/2020</a:t>
             </a:fld>
             <a:endParaRPr lang="en-GB"/>
           </a:p>
@@ -3992,7 +4019,7 @@
             <a:fld id="{2780AFAD-CDF8-4F95-A8D0-DA4862D317D0}" type="datetime1">
               <a:rPr lang="en-GB"/>
               <a:pPr lvl="0"/>
-              <a:t>05/03/2020</a:t>
+              <a:t>08/03/2020</a:t>
             </a:fld>
             <a:endParaRPr lang="en-GB"/>
           </a:p>
@@ -4120,7 +4147,7 @@
             <a:fld id="{DA881CC7-4B62-40FE-8894-1D62AD3E1235}" type="datetime1">
               <a:rPr lang="en-GB"/>
               <a:pPr lvl="0"/>
-              <a:t>05/03/2020</a:t>
+              <a:t>08/03/2020</a:t>
             </a:fld>
             <a:endParaRPr lang="en-GB"/>
           </a:p>
@@ -4405,7 +4432,7 @@
             <a:fld id="{E8746E40-E9C4-485E-BA74-533564DCBC1F}" type="datetime1">
               <a:rPr lang="en-GB"/>
               <a:pPr lvl="0"/>
-              <a:t>05/03/2020</a:t>
+              <a:t>08/03/2020</a:t>
             </a:fld>
             <a:endParaRPr lang="en-GB"/>
           </a:p>
@@ -4647,7 +4674,7 @@
             <a:fld id="{2D9616A9-ED96-4B5A-A001-3AD1B213D483}" type="datetime1">
               <a:rPr lang="en-GB"/>
               <a:pPr lvl="0"/>
-              <a:t>05/03/2020</a:t>
+              <a:t>08/03/2020</a:t>
             </a:fld>
             <a:endParaRPr lang="en-GB"/>
           </a:p>
@@ -4930,7 +4957,7 @@
             <a:fld id="{CA9C7D74-E7DA-44F6-834F-DB547607818D}" type="datetime1">
               <a:rPr lang="en-GB"/>
               <a:pPr lvl="0"/>
-              <a:t>05/03/2020</a:t>
+              <a:t>08/03/2020</a:t>
             </a:fld>
             <a:endParaRPr lang="en-GB"/>
           </a:p>
@@ -5423,9 +5450,14 @@
           <a:p>
             <a:pPr lvl="0"/>
             <a:r>
-              <a:rPr lang="en-GB" sz="5400"/>
-              <a:t>Flight Delay Analysis, and prediction along route scaling using Hadoop PySpark</a:t>
-            </a:r>
+              <a:rPr lang="en-GB" sz="5400" dirty="0"/>
+              <a:t>Flight Delay Analysis, and prediction along with route scaling using Hadoop </a:t>
+            </a:r>
+            <a:r>
+              <a:rPr lang="en-GB" sz="5400" dirty="0" err="1"/>
+              <a:t>PySpark</a:t>
+            </a:r>
+            <a:endParaRPr lang="en-GB" sz="5400" dirty="0"/>
           </a:p>
         </p:txBody>
       </p:sp>
@@ -5729,7 +5761,7 @@
               </a:lnSpc>
             </a:pPr>
             <a:r>
-              <a:rPr lang="en-GB" sz="2600"/>
+              <a:rPr lang="en-GB" sz="2600" dirty="0"/>
               <a:t>Statistics</a:t>
             </a:r>
           </a:p>
@@ -5741,7 +5773,7 @@
               <a:buNone/>
             </a:pPr>
             <a:r>
-              <a:rPr lang="en-GB" sz="2600"/>
+              <a:rPr lang="en-GB" sz="2600" dirty="0"/>
               <a:t>Constructing basic statistics like sum and average of delays based on route, origin, destination, and time.</a:t>
             </a:r>
           </a:p>
@@ -5752,7 +5784,7 @@
               </a:lnSpc>
               <a:buNone/>
             </a:pPr>
-            <a:endParaRPr lang="en-GB" sz="2600"/>
+            <a:endParaRPr lang="en-GB" sz="2600" dirty="0"/>
           </a:p>
           <a:p>
             <a:pPr lvl="0">
@@ -5761,7 +5793,7 @@
               </a:lnSpc>
             </a:pPr>
             <a:r>
-              <a:rPr lang="en-GB" sz="2600"/>
+              <a:rPr lang="en-GB" sz="2600" dirty="0"/>
               <a:t>Scaling and clustering for air traffic simulation</a:t>
             </a:r>
           </a:p>
@@ -5773,7 +5805,7 @@
               <a:buNone/>
             </a:pPr>
             <a:r>
-              <a:rPr lang="en-GB" sz="2600"/>
+              <a:rPr lang="en-GB" sz="2600" dirty="0"/>
               <a:t>With the help of Hadoop, we aim to make our dataset easily scalable, and accessible for air traffic simulation.</a:t>
             </a:r>
           </a:p>
@@ -5784,7 +5816,7 @@
               </a:lnSpc>
               <a:buNone/>
             </a:pPr>
-            <a:endParaRPr lang="en-GB" sz="2600"/>
+            <a:endParaRPr lang="en-GB" sz="2600" dirty="0"/>
           </a:p>
           <a:p>
             <a:pPr lvl="0">
@@ -5793,7 +5825,7 @@
               </a:lnSpc>
             </a:pPr>
             <a:r>
-              <a:rPr lang="en-GB" sz="2600"/>
+              <a:rPr lang="en-GB" sz="2600" dirty="0"/>
               <a:t>Prediction of flight delays</a:t>
             </a:r>
           </a:p>
@@ -5805,7 +5837,7 @@
               <a:buNone/>
             </a:pPr>
             <a:r>
-              <a:rPr lang="en-GB" sz="2600"/>
+              <a:rPr lang="en-GB" sz="2600" dirty="0"/>
               <a:t>Delay prediction model stored on Hadoop file system, with best possible accuracy.</a:t>
             </a:r>
           </a:p>
@@ -5815,7 +5847,7 @@
                 <a:spcPct val="70000"/>
               </a:lnSpc>
             </a:pPr>
-            <a:endParaRPr lang="en-GB" sz="2600"/>
+            <a:endParaRPr lang="en-GB" sz="2600" dirty="0"/>
           </a:p>
           <a:p>
             <a:pPr marL="0" lvl="0" indent="0">
@@ -5824,7 +5856,7 @@
               </a:lnSpc>
               <a:buNone/>
             </a:pPr>
-            <a:endParaRPr lang="en-GB" sz="2600"/>
+            <a:endParaRPr lang="en-GB" sz="2600" dirty="0"/>
           </a:p>
           <a:p>
             <a:pPr lvl="0">
@@ -5832,7 +5864,7 @@
                 <a:spcPct val="70000"/>
               </a:lnSpc>
             </a:pPr>
-            <a:endParaRPr lang="en-GB" sz="2600"/>
+            <a:endParaRPr lang="en-GB" sz="2600" dirty="0"/>
           </a:p>
           <a:p>
             <a:pPr marL="0" lvl="0" indent="0">
@@ -5841,7 +5873,7 @@
               </a:lnSpc>
               <a:buNone/>
             </a:pPr>
-            <a:endParaRPr lang="en-GB" sz="2600"/>
+            <a:endParaRPr lang="en-GB" sz="2600" dirty="0"/>
           </a:p>
           <a:p>
             <a:pPr marL="0" lvl="0" indent="0">
@@ -5850,7 +5882,7 @@
               </a:lnSpc>
               <a:buNone/>
             </a:pPr>
-            <a:endParaRPr lang="en-GB" sz="2600"/>
+            <a:endParaRPr lang="en-GB" sz="2600" dirty="0"/>
           </a:p>
           <a:p>
             <a:pPr marL="0" lvl="0" indent="0">
@@ -5859,7 +5891,7 @@
               </a:lnSpc>
               <a:buNone/>
             </a:pPr>
-            <a:endParaRPr lang="en-GB" sz="2600"/>
+            <a:endParaRPr lang="en-GB" sz="2600" dirty="0"/>
           </a:p>
           <a:p>
             <a:pPr lvl="0">
@@ -5867,7 +5899,7 @@
                 <a:spcPct val="70000"/>
               </a:lnSpc>
             </a:pPr>
-            <a:endParaRPr lang="en-GB" sz="2600"/>
+            <a:endParaRPr lang="en-GB" sz="2600" dirty="0"/>
           </a:p>
         </p:txBody>
       </p:sp>
@@ -6063,7 +6095,7 @@
               <a:buChar char="Ø"/>
             </a:pPr>
             <a:r>
-              <a:rPr lang="en-GB" b="1"/>
+              <a:rPr lang="en-GB" b="1" dirty="0"/>
               <a:t> Primary Research question</a:t>
             </a:r>
           </a:p>
@@ -6075,7 +6107,7 @@
               <a:buNone/>
             </a:pPr>
             <a:r>
-              <a:rPr lang="en-GB"/>
+              <a:rPr lang="en-GB" dirty="0"/>
               <a:t>- Will a scheduled domestic flight in the united states take off and arrive at its destination airport with or without delay? And who long might any delay last?</a:t>
             </a:r>
           </a:p>
@@ -6086,7 +6118,7 @@
               </a:lnSpc>
               <a:buNone/>
             </a:pPr>
-            <a:endParaRPr lang="en-GB"/>
+            <a:endParaRPr lang="en-GB" dirty="0"/>
           </a:p>
           <a:p>
             <a:pPr lvl="0">
@@ -6097,7 +6129,7 @@
               <a:buChar char="Ø"/>
             </a:pPr>
             <a:r>
-              <a:rPr lang="en-GB" b="1"/>
+              <a:rPr lang="en-GB" b="1" dirty="0"/>
               <a:t> Secondary research questions</a:t>
             </a:r>
           </a:p>
@@ -6108,7 +6140,7 @@
               </a:lnSpc>
             </a:pPr>
             <a:r>
-              <a:rPr lang="en-GB"/>
+              <a:rPr lang="en-GB" dirty="0"/>
               <a:t>Which state, city and airport is the busiest or least busy among all origins and destinations?</a:t>
             </a:r>
           </a:p>
@@ -6119,7 +6151,7 @@
               </a:lnSpc>
             </a:pPr>
             <a:r>
-              <a:rPr lang="en-GB"/>
+              <a:rPr lang="en-GB" dirty="0"/>
               <a:t>Which carrier suffers most delays and least delayed carrier?</a:t>
             </a:r>
           </a:p>
@@ -6130,7 +6162,7 @@
               </a:lnSpc>
             </a:pPr>
             <a:r>
-              <a:rPr lang="en-GB"/>
+              <a:rPr lang="en-GB" dirty="0"/>
               <a:t>When is the best day of week/time to travel to minimize delays?</a:t>
             </a:r>
           </a:p>
@@ -6141,7 +6173,7 @@
               </a:lnSpc>
             </a:pPr>
             <a:r>
-              <a:rPr lang="en-GB"/>
+              <a:rPr lang="en-GB" dirty="0"/>
               <a:t>Is it possible to make our dataset more scalable and easy to filter for use in simulation software?</a:t>
             </a:r>
           </a:p>
@@ -6152,7 +6184,7 @@
               </a:lnSpc>
               <a:buNone/>
             </a:pPr>
-            <a:endParaRPr lang="en-GB"/>
+            <a:endParaRPr lang="en-GB" dirty="0"/>
           </a:p>
         </p:txBody>
       </p:sp>
@@ -6385,21 +6417,21 @@
           <a:p>
             <a:pPr lvl="0"/>
             <a:r>
-              <a:rPr lang="en-GB"/>
+              <a:rPr lang="en-GB" dirty="0"/>
               <a:t>Datasets from: Bureau of Transportation Statistics (Domestic flights for USA).</a:t>
             </a:r>
           </a:p>
           <a:p>
             <a:pPr lvl="0"/>
             <a:r>
-              <a:rPr lang="en-GB"/>
+              <a:rPr lang="en-GB" dirty="0"/>
               <a:t>1.5 GB data consisting of flights of 2019 for all months(But more data is available from 1987).</a:t>
             </a:r>
           </a:p>
           <a:p>
             <a:pPr lvl="0"/>
             <a:r>
-              <a:rPr lang="en-GB"/>
+              <a:rPr lang="en-GB" dirty="0"/>
               <a:t>Attributes: We plan on using most of the following 34 variables.</a:t>
             </a:r>
           </a:p>
@@ -6647,8 +6679,8 @@
               <a:buNone/>
             </a:pPr>
             <a:r>
-              <a:rPr lang="en-GB" sz="2600"/>
-              <a:t>•”Predicting Flight Delays” in 2012 (Lawson &amp; Castillo), used flights datasets but included several years, which resulted in an impressive number of data points (135 million of flights) with weather data only. Used SVM, random forests, and naïve Bayes. All three methods performed about equivalently, but with error rates that were not clearly much better than a trivial predictor</a:t>
+              <a:rPr lang="en-GB" sz="2600" dirty="0"/>
+              <a:t>• ”Predicting Flight Delays” in 2012 (Lawson &amp; Castillo), used flights datasets but included several years, which resulted in an impressive number of data points (135 million of flights) with weather data only. Used SVM, random forests, and naïve Bayes. All three methods performed about equivalently, but with error rates that were not clearly much better than a trivial predictor</a:t>
             </a:r>
           </a:p>
           <a:p>
@@ -6658,7 +6690,7 @@
               </a:lnSpc>
               <a:buNone/>
             </a:pPr>
-            <a:endParaRPr lang="en-GB" sz="2600"/>
+            <a:endParaRPr lang="en-GB" sz="2600" dirty="0"/>
           </a:p>
           <a:p>
             <a:pPr lvl="0">
@@ -6667,7 +6699,7 @@
               </a:lnSpc>
             </a:pPr>
             <a:r>
-              <a:rPr lang="en-GB" sz="2600"/>
+              <a:rPr lang="en-GB" sz="2600" dirty="0"/>
               <a:t>”Predicting airline delays” in 2012 (Bandyopadhyay &amp; Guerrero, 2012), focused only on one airport(Chicago) and one airline company(AA)for 2007-08, with weather data only. Even though they were able to achieve a good score, their model is restricted to 80000 records and may not generalize well to other airlines and airports. Used SVM, Naïve Bayes and Logistic regression</a:t>
             </a:r>
           </a:p>
@@ -6754,7 +6786,7 @@
               </a:lnSpc>
             </a:pPr>
             <a:r>
-              <a:rPr lang="en-GB" sz="2200"/>
+              <a:rPr lang="en-GB" sz="2200" dirty="0"/>
               <a:t>Statistics:</a:t>
             </a:r>
           </a:p>
@@ -6766,7 +6798,7 @@
               <a:buChar char="-"/>
             </a:pPr>
             <a:r>
-              <a:rPr lang="en-GB" sz="2200"/>
+              <a:rPr lang="en-GB" sz="2200" dirty="0"/>
               <a:t>Power BI reactive model</a:t>
             </a:r>
           </a:p>
@@ -6778,9 +6810,22 @@
               <a:buNone/>
             </a:pPr>
             <a:r>
-              <a:rPr lang="en-GB" sz="2200"/>
-              <a:t>-  Pyspark framework or Hadoop MRJob</a:t>
-            </a:r>
+              <a:rPr lang="en-GB" sz="2200" dirty="0"/>
+              <a:t>-  </a:t>
+            </a:r>
+            <a:r>
+              <a:rPr lang="en-GB" sz="2200" dirty="0" err="1"/>
+              <a:t>Pyspark</a:t>
+            </a:r>
+            <a:r>
+              <a:rPr lang="en-GB" sz="2200" dirty="0"/>
+              <a:t> framework or Hadoop </a:t>
+            </a:r>
+            <a:r>
+              <a:rPr lang="en-GB" sz="2200" dirty="0" err="1"/>
+              <a:t>MRJob</a:t>
+            </a:r>
+            <a:endParaRPr lang="en-GB" sz="2200" dirty="0"/>
           </a:p>
           <a:p>
             <a:pPr marL="0" lvl="0" indent="0">
@@ -6789,7 +6834,7 @@
               </a:lnSpc>
               <a:buNone/>
             </a:pPr>
-            <a:endParaRPr lang="en-GB" sz="2200"/>
+            <a:endParaRPr lang="en-GB" sz="2200" dirty="0"/>
           </a:p>
           <a:p>
             <a:pPr lvl="0">
@@ -6798,7 +6843,7 @@
               </a:lnSpc>
             </a:pPr>
             <a:r>
-              <a:rPr lang="en-GB" sz="2200"/>
+              <a:rPr lang="en-GB" sz="2200" dirty="0"/>
               <a:t>Prediction:</a:t>
             </a:r>
           </a:p>
@@ -6810,7 +6855,7 @@
               <a:buNone/>
             </a:pPr>
             <a:r>
-              <a:rPr lang="en-GB" sz="2200"/>
+              <a:rPr lang="en-GB" sz="2200" dirty="0"/>
               <a:t>-  Decision Trees</a:t>
             </a:r>
           </a:p>
@@ -6822,7 +6867,7 @@
               <a:buNone/>
             </a:pPr>
             <a:r>
-              <a:rPr lang="en-GB" sz="2200"/>
+              <a:rPr lang="en-GB" sz="2200" dirty="0"/>
               <a:t>-  Random Forest</a:t>
             </a:r>
           </a:p>
@@ -6834,9 +6879,14 @@
               <a:buNone/>
             </a:pPr>
             <a:r>
-              <a:rPr lang="en-GB" sz="2200"/>
-              <a:t>-  XGBoost</a:t>
-            </a:r>
+              <a:rPr lang="en-GB" sz="2200" dirty="0"/>
+              <a:t>-  </a:t>
+            </a:r>
+            <a:r>
+              <a:rPr lang="en-GB" sz="2200" dirty="0" err="1"/>
+              <a:t>XGBoost</a:t>
+            </a:r>
+            <a:endParaRPr lang="en-GB" sz="2200" dirty="0"/>
           </a:p>
           <a:p>
             <a:pPr marL="0" lvl="0" indent="0">
@@ -6846,9 +6896,22 @@
               <a:buNone/>
             </a:pPr>
             <a:r>
-              <a:rPr lang="en-GB" sz="2200"/>
-              <a:t>-  Pyspark framework or Hadoop MRJob</a:t>
-            </a:r>
+              <a:rPr lang="en-GB" sz="2200" dirty="0"/>
+              <a:t>-  </a:t>
+            </a:r>
+            <a:r>
+              <a:rPr lang="en-GB" sz="2200" dirty="0" err="1"/>
+              <a:t>Pyspark</a:t>
+            </a:r>
+            <a:r>
+              <a:rPr lang="en-GB" sz="2200" dirty="0"/>
+              <a:t> framework or Hadoop </a:t>
+            </a:r>
+            <a:r>
+              <a:rPr lang="en-GB" sz="2200" dirty="0" err="1"/>
+              <a:t>MRJob</a:t>
+            </a:r>
+            <a:endParaRPr lang="en-GB" sz="2200" dirty="0"/>
           </a:p>
           <a:p>
             <a:pPr marL="0" lvl="0" indent="0">
@@ -6857,7 +6920,7 @@
               </a:lnSpc>
               <a:buNone/>
             </a:pPr>
-            <a:endParaRPr lang="en-GB" sz="2200"/>
+            <a:endParaRPr lang="en-GB" sz="2200" dirty="0"/>
           </a:p>
           <a:p>
             <a:pPr lvl="0">
@@ -6866,7 +6929,7 @@
               </a:lnSpc>
             </a:pPr>
             <a:r>
-              <a:rPr lang="en-GB" sz="2200"/>
+              <a:rPr lang="en-GB" sz="2200" dirty="0"/>
               <a:t>Scaling:</a:t>
             </a:r>
           </a:p>
@@ -6878,9 +6941,22 @@
               <a:buNone/>
             </a:pPr>
             <a:r>
-              <a:rPr lang="en-GB" sz="2200"/>
-              <a:t>-  Pyspark framework or Hadoop MRJob</a:t>
-            </a:r>
+              <a:rPr lang="en-GB" sz="2200" dirty="0"/>
+              <a:t>-  </a:t>
+            </a:r>
+            <a:r>
+              <a:rPr lang="en-GB" sz="2200" dirty="0" err="1"/>
+              <a:t>Pyspark</a:t>
+            </a:r>
+            <a:r>
+              <a:rPr lang="en-GB" sz="2200" dirty="0"/>
+              <a:t> framework or Hadoop </a:t>
+            </a:r>
+            <a:r>
+              <a:rPr lang="en-GB" sz="2200" dirty="0" err="1"/>
+              <a:t>MRJob</a:t>
+            </a:r>
+            <a:endParaRPr lang="en-GB" sz="2200" dirty="0"/>
           </a:p>
           <a:p>
             <a:pPr marL="0" lvl="0" indent="0">
@@ -6889,7 +6965,7 @@
               </a:lnSpc>
               <a:buNone/>
             </a:pPr>
-            <a:endParaRPr lang="en-GB" sz="2200"/>
+            <a:endParaRPr lang="en-GB" sz="2200" dirty="0"/>
           </a:p>
           <a:p>
             <a:pPr marL="0" lvl="0" indent="0">
@@ -6898,7 +6974,7 @@
               </a:lnSpc>
               <a:buNone/>
             </a:pPr>
-            <a:endParaRPr lang="en-GB" sz="2200"/>
+            <a:endParaRPr lang="en-GB" sz="2200" dirty="0"/>
           </a:p>
         </p:txBody>
       </p:sp>

</xml_diff>